<commit_message>
I don't want to say anytihng
</commit_message>
<xml_diff>
--- a/mediumTest/資料分析期中報告.pptx
+++ b/mediumTest/資料分析期中報告.pptx
@@ -7,6 +7,7 @@
   <p:sldIdLst>
     <p:sldId id="256" r:id="rId2"/>
     <p:sldId id="257" r:id="rId3"/>
+    <p:sldId id="258" r:id="rId4"/>
   </p:sldIdLst>
   <p:sldSz cx="12192000" cy="6858000"/>
   <p:notesSz cx="6858000" cy="9144000"/>
@@ -105,6 +106,11 @@
       </a:defRPr>
     </a:lvl9pPr>
   </p:defaultTextStyle>
+  <p:extLst>
+    <p:ext uri="{EFAFB233-063F-42B5-8137-9DF3F51BA10A}">
+      <p15:sldGuideLst xmlns:p15="http://schemas.microsoft.com/office/powerpoint/2012/main"/>
+    </p:ext>
+  </p:extLst>
 </p:presentation>
 </file>
 
@@ -3518,13 +3524,6 @@
             </a:r>
             <a:endParaRPr lang="en-US" altLang="zh-TW" dirty="0"/>
           </a:p>
-          <a:p>
-            <a:r>
-              <a:rPr lang="zh-TW" altLang="en-US"/>
-              <a:t>事實證明 </a:t>
-            </a:r>
-            <a:endParaRPr lang="en-US" altLang="zh-TW" dirty="0"/>
-          </a:p>
         </p:txBody>
       </p:sp>
       <p:pic>
@@ -3579,8 +3578,8 @@
         </p:blipFill>
         <p:spPr>
           <a:xfrm>
-            <a:off x="5377218" y="1896352"/>
-            <a:ext cx="3043261" cy="605040"/>
+            <a:off x="5377218" y="1736188"/>
+            <a:ext cx="4328167" cy="860496"/>
           </a:xfrm>
           <a:prstGeom prst="rect">
             <a:avLst/>
@@ -3748,6 +3747,750 @@
     <p:extLst>
       <p:ext uri="{BB962C8B-B14F-4D97-AF65-F5344CB8AC3E}">
         <p14:creationId xmlns:p14="http://schemas.microsoft.com/office/powerpoint/2010/main" val="2459891442"/>
+      </p:ext>
+    </p:extLst>
+  </p:cSld>
+  <p:clrMapOvr>
+    <a:masterClrMapping/>
+  </p:clrMapOvr>
+</p:sld>
+</file>
+
+<file path=ppt/slides/slide3.xml><?xml version="1.0" encoding="utf-8"?>
+<p:sld xmlns:a="http://schemas.openxmlformats.org/drawingml/2006/main" xmlns:r="http://schemas.openxmlformats.org/officeDocument/2006/relationships" xmlns:p="http://schemas.openxmlformats.org/presentationml/2006/main">
+  <p:cSld>
+    <p:spTree>
+      <p:nvGrpSpPr>
+        <p:cNvPr id="1" name=""/>
+        <p:cNvGrpSpPr/>
+        <p:nvPr/>
+      </p:nvGrpSpPr>
+      <p:grpSpPr>
+        <a:xfrm>
+          <a:off x="0" y="0"/>
+          <a:ext cx="0" cy="0"/>
+          <a:chOff x="0" y="0"/>
+          <a:chExt cx="0" cy="0"/>
+        </a:xfrm>
+      </p:grpSpPr>
+      <p:pic>
+        <p:nvPicPr>
+          <p:cNvPr id="1028" name="Picture 4" descr="美麗的鳶尾花(Iris) @ 花兒芭比，你在哪裡？ :: 痞客邦::">
+            <a:extLst>
+              <a:ext uri="{FF2B5EF4-FFF2-40B4-BE49-F238E27FC236}">
+                <a16:creationId xmlns:a16="http://schemas.microsoft.com/office/drawing/2014/main" id="{F6347D8B-9E9C-4DBB-BEEF-85A84AE173DF}"/>
+              </a:ext>
+            </a:extLst>
+          </p:cNvPr>
+          <p:cNvPicPr>
+            <a:picLocks noChangeAspect="1" noChangeArrowheads="1"/>
+          </p:cNvPicPr>
+          <p:nvPr/>
+        </p:nvPicPr>
+        <p:blipFill rotWithShape="1">
+          <a:blip r:embed="rId2">
+            <a:extLst>
+              <a:ext uri="{28A0092B-C50C-407E-A947-70E740481C1C}">
+                <a14:useLocalDpi xmlns:a14="http://schemas.microsoft.com/office/drawing/2010/main" val="0"/>
+              </a:ext>
+            </a:extLst>
+          </a:blip>
+          <a:srcRect l="17234" t="10510" r="14335" b="24933"/>
+          <a:stretch/>
+        </p:blipFill>
+        <p:spPr bwMode="auto">
+          <a:xfrm>
+            <a:off x="3648813" y="3690619"/>
+            <a:ext cx="3910819" cy="2847027"/>
+          </a:xfrm>
+          <a:prstGeom prst="rect">
+            <a:avLst/>
+          </a:prstGeom>
+          <a:noFill/>
+          <a:extLst>
+            <a:ext uri="{909E8E84-426E-40DD-AFC4-6F175D3DCCD1}">
+              <a14:hiddenFill xmlns:a14="http://schemas.microsoft.com/office/drawing/2010/main">
+                <a:solidFill>
+                  <a:srgbClr val="FFFFFF"/>
+                </a:solidFill>
+              </a14:hiddenFill>
+            </a:ext>
+          </a:extLst>
+        </p:spPr>
+      </p:pic>
+      <p:pic>
+        <p:nvPicPr>
+          <p:cNvPr id="1030" name="Picture 6" descr="維吉尼亞鳶尾—青龍鳶尾@ wcp的部落格:: 痞客邦::">
+            <a:extLst>
+              <a:ext uri="{FF2B5EF4-FFF2-40B4-BE49-F238E27FC236}">
+                <a16:creationId xmlns:a16="http://schemas.microsoft.com/office/drawing/2014/main" id="{8E41B1E8-C605-4E0C-9903-2A0B3537EBCE}"/>
+              </a:ext>
+            </a:extLst>
+          </p:cNvPr>
+          <p:cNvPicPr>
+            <a:picLocks noChangeAspect="1" noChangeArrowheads="1"/>
+          </p:cNvPicPr>
+          <p:nvPr/>
+        </p:nvPicPr>
+        <p:blipFill>
+          <a:blip r:embed="rId3">
+            <a:extLst>
+              <a:ext uri="{28A0092B-C50C-407E-A947-70E740481C1C}">
+                <a14:useLocalDpi xmlns:a14="http://schemas.microsoft.com/office/drawing/2010/main" val="0"/>
+              </a:ext>
+            </a:extLst>
+          </a:blip>
+          <a:srcRect/>
+          <a:stretch>
+            <a:fillRect/>
+          </a:stretch>
+        </p:blipFill>
+        <p:spPr bwMode="auto">
+          <a:xfrm>
+            <a:off x="7696469" y="3644491"/>
+            <a:ext cx="4259891" cy="2847027"/>
+          </a:xfrm>
+          <a:prstGeom prst="rect">
+            <a:avLst/>
+          </a:prstGeom>
+          <a:noFill/>
+          <a:extLst>
+            <a:ext uri="{909E8E84-426E-40DD-AFC4-6F175D3DCCD1}">
+              <a14:hiddenFill xmlns:a14="http://schemas.microsoft.com/office/drawing/2010/main">
+                <a:solidFill>
+                  <a:srgbClr val="FFFFFF"/>
+                </a:solidFill>
+              </a14:hiddenFill>
+            </a:ext>
+          </a:extLst>
+        </p:spPr>
+      </p:pic>
+      <p:sp>
+        <p:nvSpPr>
+          <p:cNvPr id="6" name="文字方塊 5">
+            <a:extLst>
+              <a:ext uri="{FF2B5EF4-FFF2-40B4-BE49-F238E27FC236}">
+                <a16:creationId xmlns:a16="http://schemas.microsoft.com/office/drawing/2014/main" id="{2D2A14BF-C811-40ED-9A64-CBDEB6D73746}"/>
+              </a:ext>
+            </a:extLst>
+          </p:cNvPr>
+          <p:cNvSpPr txBox="1"/>
+          <p:nvPr/>
+        </p:nvSpPr>
+        <p:spPr>
+          <a:xfrm>
+            <a:off x="4812179" y="2862881"/>
+            <a:ext cx="1584088" cy="830997"/>
+          </a:xfrm>
+          <a:prstGeom prst="rect">
+            <a:avLst/>
+          </a:prstGeom>
+          <a:noFill/>
+        </p:spPr>
+        <p:txBody>
+          <a:bodyPr wrap="none" rtlCol="0">
+            <a:spAutoFit/>
+          </a:bodyPr>
+          <a:lstStyle/>
+          <a:p>
+            <a:pPr algn="ctr"/>
+            <a:r>
+              <a:rPr lang="zh-TW" altLang="en-US" sz="2400" dirty="0">
+                <a:latin typeface="STXihei" panose="02010600040101010101" pitchFamily="2" charset="-122"/>
+                <a:ea typeface="STXihei" panose="02010600040101010101" pitchFamily="2" charset="-122"/>
+              </a:rPr>
+              <a:t>變色鳶尾</a:t>
+            </a:r>
+            <a:endParaRPr lang="en-US" altLang="zh-TW" sz="2400" dirty="0">
+              <a:latin typeface="STXihei" panose="02010600040101010101" pitchFamily="2" charset="-122"/>
+              <a:ea typeface="STXihei" panose="02010600040101010101" pitchFamily="2" charset="-122"/>
+            </a:endParaRPr>
+          </a:p>
+          <a:p>
+            <a:pPr algn="ctr"/>
+            <a:r>
+              <a:rPr lang="en-US" altLang="zh-TW" sz="2400" dirty="0">
+                <a:latin typeface="STXihei" panose="02010600040101010101" pitchFamily="2" charset="-122"/>
+                <a:ea typeface="STXihei" panose="02010600040101010101" pitchFamily="2" charset="-122"/>
+              </a:rPr>
+              <a:t>versicolor</a:t>
+            </a:r>
+            <a:endParaRPr lang="zh-TW" altLang="en-US" sz="2400" dirty="0">
+              <a:latin typeface="STXihei" panose="02010600040101010101" pitchFamily="2" charset="-122"/>
+              <a:ea typeface="STXihei" panose="02010600040101010101" pitchFamily="2" charset="-122"/>
+            </a:endParaRPr>
+          </a:p>
+        </p:txBody>
+      </p:sp>
+      <p:sp>
+        <p:nvSpPr>
+          <p:cNvPr id="10" name="文字方塊 9">
+            <a:extLst>
+              <a:ext uri="{FF2B5EF4-FFF2-40B4-BE49-F238E27FC236}">
+                <a16:creationId xmlns:a16="http://schemas.microsoft.com/office/drawing/2014/main" id="{71A7FB22-FC6B-4257-A294-6775BB23C8E7}"/>
+              </a:ext>
+            </a:extLst>
+          </p:cNvPr>
+          <p:cNvSpPr txBox="1"/>
+          <p:nvPr/>
+        </p:nvSpPr>
+        <p:spPr>
+          <a:xfrm>
+            <a:off x="1004288" y="2903824"/>
+            <a:ext cx="1138453" cy="830997"/>
+          </a:xfrm>
+          <a:prstGeom prst="rect">
+            <a:avLst/>
+          </a:prstGeom>
+          <a:noFill/>
+        </p:spPr>
+        <p:txBody>
+          <a:bodyPr wrap="none" rtlCol="0">
+            <a:spAutoFit/>
+          </a:bodyPr>
+          <a:lstStyle/>
+          <a:p>
+            <a:pPr algn="ctr"/>
+            <a:r>
+              <a:rPr lang="zh-TW" altLang="en-US" sz="2400" dirty="0">
+                <a:latin typeface="STXihei" panose="02010600040101010101" pitchFamily="2" charset="-122"/>
+                <a:ea typeface="STXihei" panose="02010600040101010101" pitchFamily="2" charset="-122"/>
+              </a:rPr>
+              <a:t>山鳶尾</a:t>
+            </a:r>
+            <a:endParaRPr lang="en-US" altLang="zh-TW" sz="2400" dirty="0">
+              <a:latin typeface="STXihei" panose="02010600040101010101" pitchFamily="2" charset="-122"/>
+              <a:ea typeface="STXihei" panose="02010600040101010101" pitchFamily="2" charset="-122"/>
+            </a:endParaRPr>
+          </a:p>
+          <a:p>
+            <a:pPr algn="ctr"/>
+            <a:r>
+              <a:rPr lang="en-US" altLang="zh-TW" sz="2400" dirty="0">
+                <a:latin typeface="STXihei" panose="02010600040101010101" pitchFamily="2" charset="-122"/>
+                <a:ea typeface="STXihei" panose="02010600040101010101" pitchFamily="2" charset="-122"/>
+              </a:rPr>
+              <a:t>setosa</a:t>
+            </a:r>
+            <a:endParaRPr lang="zh-TW" altLang="en-US" sz="2400" dirty="0">
+              <a:latin typeface="STXihei" panose="02010600040101010101" pitchFamily="2" charset="-122"/>
+              <a:ea typeface="STXihei" panose="02010600040101010101" pitchFamily="2" charset="-122"/>
+            </a:endParaRPr>
+          </a:p>
+        </p:txBody>
+      </p:sp>
+      <p:sp>
+        <p:nvSpPr>
+          <p:cNvPr id="14" name="文字方塊 13">
+            <a:extLst>
+              <a:ext uri="{FF2B5EF4-FFF2-40B4-BE49-F238E27FC236}">
+                <a16:creationId xmlns:a16="http://schemas.microsoft.com/office/drawing/2014/main" id="{35AE0A0C-C226-4DB6-80AA-8ED061516BFE}"/>
+              </a:ext>
+            </a:extLst>
+          </p:cNvPr>
+          <p:cNvSpPr txBox="1"/>
+          <p:nvPr/>
+        </p:nvSpPr>
+        <p:spPr>
+          <a:xfrm>
+            <a:off x="8860131" y="2859621"/>
+            <a:ext cx="2031325" cy="830997"/>
+          </a:xfrm>
+          <a:prstGeom prst="rect">
+            <a:avLst/>
+          </a:prstGeom>
+          <a:noFill/>
+        </p:spPr>
+        <p:txBody>
+          <a:bodyPr wrap="none" rtlCol="0">
+            <a:spAutoFit/>
+          </a:bodyPr>
+          <a:lstStyle/>
+          <a:p>
+            <a:pPr algn="ctr"/>
+            <a:r>
+              <a:rPr lang="zh-TW" altLang="en-US" sz="2400" dirty="0">
+                <a:latin typeface="STXihei" panose="02010600040101010101" pitchFamily="2" charset="-122"/>
+                <a:ea typeface="STXihei" panose="02010600040101010101" pitchFamily="2" charset="-122"/>
+              </a:rPr>
+              <a:t>維吉尼亞鳶尾</a:t>
+            </a:r>
+            <a:endParaRPr lang="en-US" altLang="zh-TW" sz="2400" dirty="0">
+              <a:latin typeface="STXihei" panose="02010600040101010101" pitchFamily="2" charset="-122"/>
+              <a:ea typeface="STXihei" panose="02010600040101010101" pitchFamily="2" charset="-122"/>
+            </a:endParaRPr>
+          </a:p>
+          <a:p>
+            <a:pPr algn="ctr"/>
+            <a:r>
+              <a:rPr lang="en-US" altLang="zh-TW" sz="2400" dirty="0">
+                <a:latin typeface="STXihei" panose="02010600040101010101" pitchFamily="2" charset="-122"/>
+                <a:ea typeface="STXihei" panose="02010600040101010101" pitchFamily="2" charset="-122"/>
+              </a:rPr>
+              <a:t>virginica</a:t>
+            </a:r>
+            <a:endParaRPr lang="zh-TW" altLang="en-US" sz="2400" dirty="0">
+              <a:latin typeface="STXihei" panose="02010600040101010101" pitchFamily="2" charset="-122"/>
+              <a:ea typeface="STXihei" panose="02010600040101010101" pitchFamily="2" charset="-122"/>
+            </a:endParaRPr>
+          </a:p>
+        </p:txBody>
+      </p:sp>
+      <p:pic>
+        <p:nvPicPr>
+          <p:cNvPr id="1032" name="Picture 8" descr="IRIS SETOSA 'BABY BLUE' SEEDS (8 seeds) (Bristle-pointed iris 'Baby Blue',  Wild iris 'Baby Blue', Northern flag 'Baby Blue', Beachhead iris 'Baby  Blue') - Plant World Seeds">
+            <a:extLst>
+              <a:ext uri="{FF2B5EF4-FFF2-40B4-BE49-F238E27FC236}">
+                <a16:creationId xmlns:a16="http://schemas.microsoft.com/office/drawing/2014/main" id="{72DFDD59-A2B4-4A16-AE03-AA799E069CB7}"/>
+              </a:ext>
+            </a:extLst>
+          </p:cNvPr>
+          <p:cNvPicPr>
+            <a:picLocks noChangeAspect="1" noChangeArrowheads="1"/>
+          </p:cNvPicPr>
+          <p:nvPr/>
+        </p:nvPicPr>
+        <p:blipFill>
+          <a:blip r:embed="rId4">
+            <a:extLst>
+              <a:ext uri="{28A0092B-C50C-407E-A947-70E740481C1C}">
+                <a14:useLocalDpi xmlns:a14="http://schemas.microsoft.com/office/drawing/2010/main" val="0"/>
+              </a:ext>
+            </a:extLst>
+          </a:blip>
+          <a:srcRect/>
+          <a:stretch>
+            <a:fillRect/>
+          </a:stretch>
+        </p:blipFill>
+        <p:spPr bwMode="auto">
+          <a:xfrm>
+            <a:off x="145661" y="3690619"/>
+            <a:ext cx="2847027" cy="2847027"/>
+          </a:xfrm>
+          <a:prstGeom prst="rect">
+            <a:avLst/>
+          </a:prstGeom>
+          <a:noFill/>
+          <a:extLst>
+            <a:ext uri="{909E8E84-426E-40DD-AFC4-6F175D3DCCD1}">
+              <a14:hiddenFill xmlns:a14="http://schemas.microsoft.com/office/drawing/2010/main">
+                <a:solidFill>
+                  <a:srgbClr val="FFFFFF"/>
+                </a:solidFill>
+              </a14:hiddenFill>
+            </a:ext>
+          </a:extLst>
+        </p:spPr>
+      </p:pic>
+      <p:grpSp>
+        <p:nvGrpSpPr>
+          <p:cNvPr id="17" name="群組 16">
+            <a:extLst>
+              <a:ext uri="{FF2B5EF4-FFF2-40B4-BE49-F238E27FC236}">
+                <a16:creationId xmlns:a16="http://schemas.microsoft.com/office/drawing/2014/main" id="{0727B956-5E5B-4C19-98AE-0AA9C393CB11}"/>
+              </a:ext>
+            </a:extLst>
+          </p:cNvPr>
+          <p:cNvGrpSpPr/>
+          <p:nvPr/>
+        </p:nvGrpSpPr>
+        <p:grpSpPr>
+          <a:xfrm>
+            <a:off x="194852" y="218460"/>
+            <a:ext cx="9680941" cy="1227135"/>
+            <a:chOff x="709004" y="1411860"/>
+            <a:chExt cx="9680941" cy="1227135"/>
+          </a:xfrm>
+        </p:grpSpPr>
+        <p:pic>
+          <p:nvPicPr>
+            <p:cNvPr id="5" name="圖片 4">
+              <a:extLst>
+                <a:ext uri="{FF2B5EF4-FFF2-40B4-BE49-F238E27FC236}">
+                  <a16:creationId xmlns:a16="http://schemas.microsoft.com/office/drawing/2014/main" id="{B57A97F3-B19E-42F1-9D44-5723D77B7992}"/>
+                </a:ext>
+              </a:extLst>
+            </p:cNvPr>
+            <p:cNvPicPr>
+              <a:picLocks noChangeAspect="1"/>
+            </p:cNvPicPr>
+            <p:nvPr/>
+          </p:nvPicPr>
+          <p:blipFill>
+            <a:blip r:embed="rId5"/>
+            <a:stretch>
+              <a:fillRect/>
+            </a:stretch>
+          </p:blipFill>
+          <p:spPr>
+            <a:xfrm>
+              <a:off x="2558543" y="1411861"/>
+              <a:ext cx="3353268" cy="819264"/>
+            </a:xfrm>
+            <a:prstGeom prst="rect">
+              <a:avLst/>
+            </a:prstGeom>
+            <a:ln w="38100" cap="sq">
+              <a:solidFill>
+                <a:srgbClr val="000000"/>
+              </a:solidFill>
+              <a:prstDash val="solid"/>
+              <a:miter lim="800000"/>
+            </a:ln>
+            <a:effectLst>
+              <a:outerShdw blurRad="50800" dist="38100" dir="2700000" algn="tl" rotWithShape="0">
+                <a:srgbClr val="000000">
+                  <a:alpha val="43000"/>
+                </a:srgbClr>
+              </a:outerShdw>
+            </a:effectLst>
+          </p:spPr>
+        </p:pic>
+        <p:sp>
+          <p:nvSpPr>
+            <p:cNvPr id="8" name="文字方塊 7">
+              <a:extLst>
+                <a:ext uri="{FF2B5EF4-FFF2-40B4-BE49-F238E27FC236}">
+                  <a16:creationId xmlns:a16="http://schemas.microsoft.com/office/drawing/2014/main" id="{8302E607-5101-4B87-BD8E-40D1C8DF4B63}"/>
+                </a:ext>
+              </a:extLst>
+            </p:cNvPr>
+            <p:cNvSpPr txBox="1"/>
+            <p:nvPr/>
+          </p:nvSpPr>
+          <p:spPr>
+            <a:xfrm>
+              <a:off x="709004" y="1559882"/>
+              <a:ext cx="1720343" cy="523220"/>
+            </a:xfrm>
+            <a:prstGeom prst="rect">
+              <a:avLst/>
+            </a:prstGeom>
+            <a:noFill/>
+          </p:spPr>
+          <p:txBody>
+            <a:bodyPr wrap="none" rtlCol="0">
+              <a:spAutoFit/>
+            </a:bodyPr>
+            <a:lstStyle/>
+            <a:p>
+              <a:r>
+                <a:rPr lang="zh-TW" altLang="en-US" sz="2800" dirty="0">
+                  <a:latin typeface="STXihei" panose="02010600040101010101" pitchFamily="2" charset="-122"/>
+                  <a:ea typeface="STXihei" panose="02010600040101010101" pitchFamily="2" charset="-122"/>
+                </a:rPr>
+                <a:t>分群結果</a:t>
+              </a:r>
+              <a:r>
+                <a:rPr lang="en-US" altLang="zh-TW" sz="2800" dirty="0">
+                  <a:latin typeface="STXihei" panose="02010600040101010101" pitchFamily="2" charset="-122"/>
+                  <a:ea typeface="STXihei" panose="02010600040101010101" pitchFamily="2" charset="-122"/>
+                </a:rPr>
+                <a:t>:</a:t>
+              </a:r>
+              <a:endParaRPr lang="zh-TW" altLang="en-US" sz="2800" dirty="0">
+                <a:latin typeface="STXihei" panose="02010600040101010101" pitchFamily="2" charset="-122"/>
+                <a:ea typeface="STXihei" panose="02010600040101010101" pitchFamily="2" charset="-122"/>
+              </a:endParaRPr>
+            </a:p>
+          </p:txBody>
+        </p:sp>
+        <p:pic>
+          <p:nvPicPr>
+            <p:cNvPr id="12" name="圖片 11">
+              <a:extLst>
+                <a:ext uri="{FF2B5EF4-FFF2-40B4-BE49-F238E27FC236}">
+                  <a16:creationId xmlns:a16="http://schemas.microsoft.com/office/drawing/2014/main" id="{476D740D-837D-4CF9-ACAB-1844CA6FBD25}"/>
+                </a:ext>
+              </a:extLst>
+            </p:cNvPr>
+            <p:cNvPicPr>
+              <a:picLocks noChangeAspect="1"/>
+            </p:cNvPicPr>
+            <p:nvPr/>
+          </p:nvPicPr>
+          <p:blipFill rotWithShape="1">
+            <a:blip r:embed="rId6"/>
+            <a:srcRect t="9920"/>
+            <a:stretch/>
+          </p:blipFill>
+          <p:spPr>
+            <a:xfrm>
+              <a:off x="6211227" y="1411860"/>
+              <a:ext cx="4178718" cy="819264"/>
+            </a:xfrm>
+            <a:prstGeom prst="rect">
+              <a:avLst/>
+            </a:prstGeom>
+            <a:ln w="38100" cap="sq">
+              <a:solidFill>
+                <a:srgbClr val="000000"/>
+              </a:solidFill>
+              <a:prstDash val="solid"/>
+              <a:miter lim="800000"/>
+            </a:ln>
+            <a:effectLst>
+              <a:outerShdw blurRad="50800" dist="38100" dir="2700000" algn="tl" rotWithShape="0">
+                <a:srgbClr val="000000">
+                  <a:alpha val="43000"/>
+                </a:srgbClr>
+              </a:outerShdw>
+            </a:effectLst>
+          </p:spPr>
+        </p:pic>
+        <p:sp>
+          <p:nvSpPr>
+            <p:cNvPr id="21" name="文字方塊 20">
+              <a:extLst>
+                <a:ext uri="{FF2B5EF4-FFF2-40B4-BE49-F238E27FC236}">
+                  <a16:creationId xmlns:a16="http://schemas.microsoft.com/office/drawing/2014/main" id="{B20968C6-7320-4479-AFB0-7DFC38581349}"/>
+                </a:ext>
+              </a:extLst>
+            </p:cNvPr>
+            <p:cNvSpPr txBox="1"/>
+            <p:nvPr/>
+          </p:nvSpPr>
+          <p:spPr>
+            <a:xfrm>
+              <a:off x="3648813" y="2238885"/>
+              <a:ext cx="954107" cy="400110"/>
+            </a:xfrm>
+            <a:prstGeom prst="rect">
+              <a:avLst/>
+            </a:prstGeom>
+            <a:noFill/>
+          </p:spPr>
+          <p:txBody>
+            <a:bodyPr wrap="none" rtlCol="0">
+              <a:spAutoFit/>
+            </a:bodyPr>
+            <a:lstStyle/>
+            <a:p>
+              <a:r>
+                <a:rPr lang="zh-TW" altLang="en-US" sz="2000" dirty="0">
+                  <a:latin typeface="STXihei" panose="02010600040101010101" pitchFamily="2" charset="-122"/>
+                  <a:ea typeface="STXihei" panose="02010600040101010101" pitchFamily="2" charset="-122"/>
+                </a:rPr>
+                <a:t>分三群</a:t>
+              </a:r>
+            </a:p>
+          </p:txBody>
+        </p:sp>
+        <p:sp>
+          <p:nvSpPr>
+            <p:cNvPr id="22" name="文字方塊 21">
+              <a:extLst>
+                <a:ext uri="{FF2B5EF4-FFF2-40B4-BE49-F238E27FC236}">
+                  <a16:creationId xmlns:a16="http://schemas.microsoft.com/office/drawing/2014/main" id="{C0A9F2B6-D982-4063-AA2E-FBE0A2E7C4F5}"/>
+                </a:ext>
+              </a:extLst>
+            </p:cNvPr>
+            <p:cNvSpPr txBox="1"/>
+            <p:nvPr/>
+          </p:nvSpPr>
+          <p:spPr>
+            <a:xfrm>
+              <a:off x="7932109" y="2222110"/>
+              <a:ext cx="954107" cy="400110"/>
+            </a:xfrm>
+            <a:prstGeom prst="rect">
+              <a:avLst/>
+            </a:prstGeom>
+            <a:noFill/>
+          </p:spPr>
+          <p:txBody>
+            <a:bodyPr wrap="none" rtlCol="0">
+              <a:spAutoFit/>
+            </a:bodyPr>
+            <a:lstStyle/>
+            <a:p>
+              <a:r>
+                <a:rPr lang="zh-TW" altLang="en-US" sz="2000" dirty="0">
+                  <a:latin typeface="STXihei" panose="02010600040101010101" pitchFamily="2" charset="-122"/>
+                  <a:ea typeface="STXihei" panose="02010600040101010101" pitchFamily="2" charset="-122"/>
+                </a:rPr>
+                <a:t>分二群</a:t>
+              </a:r>
+            </a:p>
+          </p:txBody>
+        </p:sp>
+      </p:grpSp>
+      <p:sp>
+        <p:nvSpPr>
+          <p:cNvPr id="24" name="文字方塊 23">
+            <a:extLst>
+              <a:ext uri="{FF2B5EF4-FFF2-40B4-BE49-F238E27FC236}">
+                <a16:creationId xmlns:a16="http://schemas.microsoft.com/office/drawing/2014/main" id="{76FFB826-EB63-4FE3-B73C-8D871C14D9B5}"/>
+              </a:ext>
+            </a:extLst>
+          </p:cNvPr>
+          <p:cNvSpPr txBox="1"/>
+          <p:nvPr/>
+        </p:nvSpPr>
+        <p:spPr>
+          <a:xfrm>
+            <a:off x="145661" y="1455830"/>
+            <a:ext cx="11660655" cy="954107"/>
+          </a:xfrm>
+          <a:prstGeom prst="rect">
+            <a:avLst/>
+          </a:prstGeom>
+          <a:noFill/>
+        </p:spPr>
+        <p:txBody>
+          <a:bodyPr wrap="square" rtlCol="0">
+            <a:spAutoFit/>
+          </a:bodyPr>
+          <a:lstStyle/>
+          <a:p>
+            <a:r>
+              <a:rPr lang="zh-TW" altLang="en-US" sz="2800" dirty="0">
+                <a:latin typeface="STXihei" panose="02010600040101010101" pitchFamily="2" charset="-122"/>
+                <a:ea typeface="STXihei" panose="02010600040101010101" pitchFamily="2" charset="-122"/>
+              </a:rPr>
+              <a:t>觀察圖可以發現 </a:t>
+            </a:r>
+            <a:r>
+              <a:rPr lang="en-US" altLang="zh-TW" sz="2800" dirty="0">
+                <a:latin typeface="STXihei" panose="02010600040101010101" pitchFamily="2" charset="-122"/>
+                <a:ea typeface="STXihei" panose="02010600040101010101" pitchFamily="2" charset="-122"/>
+              </a:rPr>
+              <a:t>(</a:t>
+            </a:r>
+            <a:r>
+              <a:rPr lang="zh-TW" altLang="en-US" sz="2800" dirty="0">
+                <a:latin typeface="STXihei" panose="02010600040101010101" pitchFamily="2" charset="-122"/>
+                <a:ea typeface="STXihei" panose="02010600040101010101" pitchFamily="2" charset="-122"/>
+              </a:rPr>
+              <a:t>變色鳶尾</a:t>
+            </a:r>
+            <a:r>
+              <a:rPr lang="en-US" altLang="zh-TW" sz="2800" dirty="0">
+                <a:latin typeface="STXihei" panose="02010600040101010101" pitchFamily="2" charset="-122"/>
+                <a:ea typeface="STXihei" panose="02010600040101010101" pitchFamily="2" charset="-122"/>
+              </a:rPr>
+              <a:t>)</a:t>
+            </a:r>
+            <a:r>
+              <a:rPr lang="zh-TW" altLang="en-US" sz="2800" dirty="0">
+                <a:latin typeface="STXihei" panose="02010600040101010101" pitchFamily="2" charset="-122"/>
+                <a:ea typeface="STXihei" panose="02010600040101010101" pitchFamily="2" charset="-122"/>
+              </a:rPr>
+              <a:t> 和 </a:t>
+            </a:r>
+            <a:r>
+              <a:rPr lang="en-US" altLang="zh-TW" sz="2800" dirty="0">
+                <a:latin typeface="STXihei" panose="02010600040101010101" pitchFamily="2" charset="-122"/>
+                <a:ea typeface="STXihei" panose="02010600040101010101" pitchFamily="2" charset="-122"/>
+              </a:rPr>
+              <a:t>(</a:t>
+            </a:r>
+            <a:r>
+              <a:rPr lang="zh-TW" altLang="en-US" sz="2800" dirty="0">
+                <a:latin typeface="STXihei" panose="02010600040101010101" pitchFamily="2" charset="-122"/>
+                <a:ea typeface="STXihei" panose="02010600040101010101" pitchFamily="2" charset="-122"/>
+              </a:rPr>
+              <a:t>維吉尼亞鳶尾</a:t>
+            </a:r>
+            <a:r>
+              <a:rPr lang="en-US" altLang="zh-TW" sz="2800" dirty="0">
+                <a:latin typeface="STXihei" panose="02010600040101010101" pitchFamily="2" charset="-122"/>
+                <a:ea typeface="STXihei" panose="02010600040101010101" pitchFamily="2" charset="-122"/>
+              </a:rPr>
+              <a:t>)</a:t>
+            </a:r>
+            <a:r>
+              <a:rPr lang="zh-TW" altLang="en-US" sz="2800" dirty="0">
+                <a:latin typeface="STXihei" panose="02010600040101010101" pitchFamily="2" charset="-122"/>
+                <a:ea typeface="STXihei" panose="02010600040101010101" pitchFamily="2" charset="-122"/>
+              </a:rPr>
+              <a:t> 長得非常相似</a:t>
+            </a:r>
+            <a:endParaRPr lang="en-US" altLang="zh-TW" sz="2800" dirty="0">
+              <a:latin typeface="STXihei" panose="02010600040101010101" pitchFamily="2" charset="-122"/>
+              <a:ea typeface="STXihei" panose="02010600040101010101" pitchFamily="2" charset="-122"/>
+            </a:endParaRPr>
+          </a:p>
+          <a:p>
+            <a:r>
+              <a:rPr lang="zh-TW" altLang="en-US" sz="2800" dirty="0">
+                <a:latin typeface="STXihei" panose="02010600040101010101" pitchFamily="2" charset="-122"/>
+                <a:ea typeface="STXihei" panose="02010600040101010101" pitchFamily="2" charset="-122"/>
+              </a:rPr>
+              <a:t>而分群出來的結果也</a:t>
+            </a:r>
+            <a:r>
+              <a:rPr lang="zh-TW" altLang="en-US" sz="2800" dirty="0">
+                <a:highlight>
+                  <a:srgbClr val="FFFF00"/>
+                </a:highlight>
+                <a:latin typeface="STXihei" panose="02010600040101010101" pitchFamily="2" charset="-122"/>
+                <a:ea typeface="STXihei" panose="02010600040101010101" pitchFamily="2" charset="-122"/>
+              </a:rPr>
+              <a:t>符合預期</a:t>
+            </a:r>
+          </a:p>
+        </p:txBody>
+      </p:sp>
+      <p:sp>
+        <p:nvSpPr>
+          <p:cNvPr id="18" name="矩形 17">
+            <a:extLst>
+              <a:ext uri="{FF2B5EF4-FFF2-40B4-BE49-F238E27FC236}">
+                <a16:creationId xmlns:a16="http://schemas.microsoft.com/office/drawing/2014/main" id="{35FB78D5-F42D-4532-AE4C-BD91E5A6E5C4}"/>
+              </a:ext>
+            </a:extLst>
+          </p:cNvPr>
+          <p:cNvSpPr/>
+          <p:nvPr/>
+        </p:nvSpPr>
+        <p:spPr>
+          <a:xfrm>
+            <a:off x="3439236" y="2641102"/>
+            <a:ext cx="8607103" cy="3942670"/>
+          </a:xfrm>
+          <a:prstGeom prst="rect">
+            <a:avLst/>
+          </a:prstGeom>
+          <a:noFill/>
+          <a:ln w="9525" cap="flat" cmpd="sng" algn="ctr">
+            <a:solidFill>
+              <a:schemeClr val="accent1"/>
+            </a:solidFill>
+            <a:prstDash val="solid"/>
+            <a:round/>
+            <a:headEnd type="none" w="med" len="med"/>
+            <a:tailEnd type="none" w="med" len="med"/>
+          </a:ln>
+        </p:spPr>
+        <p:style>
+          <a:lnRef idx="0">
+            <a:scrgbClr r="0" g="0" b="0"/>
+          </a:lnRef>
+          <a:fillRef idx="0">
+            <a:scrgbClr r="0" g="0" b="0"/>
+          </a:fillRef>
+          <a:effectRef idx="0">
+            <a:scrgbClr r="0" g="0" b="0"/>
+          </a:effectRef>
+          <a:fontRef idx="minor">
+            <a:schemeClr val="accent1"/>
+          </a:fontRef>
+        </p:style>
+        <p:txBody>
+          <a:bodyPr rtlCol="0" anchor="ctr"/>
+          <a:lstStyle/>
+          <a:p>
+            <a:pPr algn="ctr"/>
+            <a:endParaRPr lang="zh-TW" altLang="en-US"/>
+          </a:p>
+        </p:txBody>
+      </p:sp>
+    </p:spTree>
+    <p:extLst>
+      <p:ext uri="{BB962C8B-B14F-4D97-AF65-F5344CB8AC3E}">
+        <p14:creationId xmlns:p14="http://schemas.microsoft.com/office/powerpoint/2010/main" val="1609933054"/>
       </p:ext>
     </p:extLst>
   </p:cSld>

</xml_diff>